<commit_message>
Updated presentation - still incomplete
More filled out, still a few things to add which will finish it off
</commit_message>
<xml_diff>
--- a/Presentations/Pitch 1 Presentation.pptx
+++ b/Presentations/Pitch 1 Presentation.pptx
@@ -4,18 +4,21 @@
   <p:sldMasterIdLst>
     <p:sldMasterId id="2147483780" r:id="rId1"/>
   </p:sldMasterIdLst>
+  <p:notesMasterIdLst>
+    <p:notesMasterId r:id="rId15"/>
+  </p:notesMasterIdLst>
   <p:sldIdLst>
     <p:sldId id="256" r:id="rId2"/>
-    <p:sldId id="257" r:id="rId3"/>
-    <p:sldId id="258" r:id="rId4"/>
+    <p:sldId id="258" r:id="rId3"/>
+    <p:sldId id="257" r:id="rId4"/>
     <p:sldId id="267" r:id="rId5"/>
-    <p:sldId id="259" r:id="rId6"/>
-    <p:sldId id="268" r:id="rId7"/>
-    <p:sldId id="261" r:id="rId8"/>
-    <p:sldId id="260" r:id="rId9"/>
-    <p:sldId id="266" r:id="rId10"/>
+    <p:sldId id="269" r:id="rId6"/>
+    <p:sldId id="259" r:id="rId7"/>
+    <p:sldId id="268" r:id="rId8"/>
+    <p:sldId id="266" r:id="rId9"/>
+    <p:sldId id="260" r:id="rId10"/>
     <p:sldId id="262" r:id="rId11"/>
-    <p:sldId id="263" r:id="rId12"/>
+    <p:sldId id="270" r:id="rId12"/>
     <p:sldId id="264" r:id="rId13"/>
     <p:sldId id="265" r:id="rId14"/>
   </p:sldIdLst>
@@ -119,6 +122,442 @@
 </p:presentation>
 </file>
 
+<file path=ppt/notesMasters/notesMaster1.xml><?xml version="1.0" encoding="utf-8"?>
+<p:notesMaster xmlns:a="http://schemas.openxmlformats.org/drawingml/2006/main" xmlns:r="http://schemas.openxmlformats.org/officeDocument/2006/relationships" xmlns:p="http://schemas.openxmlformats.org/presentationml/2006/main">
+  <p:cSld>
+    <p:bg>
+      <p:bgRef idx="1001">
+        <a:schemeClr val="bg1"/>
+      </p:bgRef>
+    </p:bg>
+    <p:spTree>
+      <p:nvGrpSpPr>
+        <p:cNvPr id="1" name=""/>
+        <p:cNvGrpSpPr/>
+        <p:nvPr/>
+      </p:nvGrpSpPr>
+      <p:grpSpPr>
+        <a:xfrm>
+          <a:off x="0" y="0"/>
+          <a:ext cx="0" cy="0"/>
+          <a:chOff x="0" y="0"/>
+          <a:chExt cx="0" cy="0"/>
+        </a:xfrm>
+      </p:grpSpPr>
+      <p:sp>
+        <p:nvSpPr>
+          <p:cNvPr id="2" name="Header Placeholder 1"/>
+          <p:cNvSpPr>
+            <a:spLocks noGrp="1"/>
+          </p:cNvSpPr>
+          <p:nvPr>
+            <p:ph type="hdr" sz="quarter"/>
+          </p:nvPr>
+        </p:nvSpPr>
+        <p:spPr>
+          <a:xfrm>
+            <a:off x="0" y="0"/>
+            <a:ext cx="2971800" cy="457200"/>
+          </a:xfrm>
+          <a:prstGeom prst="rect">
+            <a:avLst/>
+          </a:prstGeom>
+        </p:spPr>
+        <p:txBody>
+          <a:bodyPr vert="horz" lIns="91440" tIns="45720" rIns="91440" bIns="45720" rtlCol="0"/>
+          <a:lstStyle>
+            <a:lvl1pPr algn="l">
+              <a:defRPr sz="1200"/>
+            </a:lvl1pPr>
+          </a:lstStyle>
+          <a:p>
+            <a:endParaRPr lang="en-GB"/>
+          </a:p>
+        </p:txBody>
+      </p:sp>
+      <p:sp>
+        <p:nvSpPr>
+          <p:cNvPr id="3" name="Date Placeholder 2"/>
+          <p:cNvSpPr>
+            <a:spLocks noGrp="1"/>
+          </p:cNvSpPr>
+          <p:nvPr>
+            <p:ph type="dt" idx="1"/>
+          </p:nvPr>
+        </p:nvSpPr>
+        <p:spPr>
+          <a:xfrm>
+            <a:off x="3884613" y="0"/>
+            <a:ext cx="2971800" cy="457200"/>
+          </a:xfrm>
+          <a:prstGeom prst="rect">
+            <a:avLst/>
+          </a:prstGeom>
+        </p:spPr>
+        <p:txBody>
+          <a:bodyPr vert="horz" lIns="91440" tIns="45720" rIns="91440" bIns="45720" rtlCol="0"/>
+          <a:lstStyle>
+            <a:lvl1pPr algn="r">
+              <a:defRPr sz="1200"/>
+            </a:lvl1pPr>
+          </a:lstStyle>
+          <a:p>
+            <a:fld id="{EEF55EE8-5704-4433-9DAB-210645A04EF3}" type="datetimeFigureOut">
+              <a:rPr lang="en-GB" smtClean="0"/>
+              <a:t>31/01/2017</a:t>
+            </a:fld>
+            <a:endParaRPr lang="en-GB"/>
+          </a:p>
+        </p:txBody>
+      </p:sp>
+      <p:sp>
+        <p:nvSpPr>
+          <p:cNvPr id="4" name="Slide Image Placeholder 3"/>
+          <p:cNvSpPr>
+            <a:spLocks noGrp="1" noRot="1" noChangeAspect="1"/>
+          </p:cNvSpPr>
+          <p:nvPr>
+            <p:ph type="sldImg" idx="2"/>
+          </p:nvPr>
+        </p:nvSpPr>
+        <p:spPr>
+          <a:xfrm>
+            <a:off x="1143000" y="685800"/>
+            <a:ext cx="4572000" cy="3429000"/>
+          </a:xfrm>
+          <a:prstGeom prst="rect">
+            <a:avLst/>
+          </a:prstGeom>
+          <a:noFill/>
+          <a:ln w="12700">
+            <a:solidFill>
+              <a:prstClr val="black"/>
+            </a:solidFill>
+          </a:ln>
+        </p:spPr>
+        <p:txBody>
+          <a:bodyPr vert="horz" lIns="91440" tIns="45720" rIns="91440" bIns="45720" rtlCol="0" anchor="ctr"/>
+          <a:lstStyle/>
+          <a:p>
+            <a:endParaRPr lang="en-GB"/>
+          </a:p>
+        </p:txBody>
+      </p:sp>
+      <p:sp>
+        <p:nvSpPr>
+          <p:cNvPr id="5" name="Notes Placeholder 4"/>
+          <p:cNvSpPr>
+            <a:spLocks noGrp="1"/>
+          </p:cNvSpPr>
+          <p:nvPr>
+            <p:ph type="body" sz="quarter" idx="3"/>
+          </p:nvPr>
+        </p:nvSpPr>
+        <p:spPr>
+          <a:xfrm>
+            <a:off x="685800" y="4343400"/>
+            <a:ext cx="5486400" cy="4114800"/>
+          </a:xfrm>
+          <a:prstGeom prst="rect">
+            <a:avLst/>
+          </a:prstGeom>
+        </p:spPr>
+        <p:txBody>
+          <a:bodyPr vert="horz" lIns="91440" tIns="45720" rIns="91440" bIns="45720" rtlCol="0">
+            <a:normAutofit/>
+          </a:bodyPr>
+          <a:lstStyle/>
+          <a:p>
+            <a:pPr lvl="0"/>
+            <a:r>
+              <a:rPr lang="en-US" smtClean="0"/>
+              <a:t>Click to edit Master text styles</a:t>
+            </a:r>
+          </a:p>
+          <a:p>
+            <a:pPr lvl="1"/>
+            <a:r>
+              <a:rPr lang="en-US" smtClean="0"/>
+              <a:t>Second level</a:t>
+            </a:r>
+          </a:p>
+          <a:p>
+            <a:pPr lvl="2"/>
+            <a:r>
+              <a:rPr lang="en-US" smtClean="0"/>
+              <a:t>Third level</a:t>
+            </a:r>
+          </a:p>
+          <a:p>
+            <a:pPr lvl="3"/>
+            <a:r>
+              <a:rPr lang="en-US" smtClean="0"/>
+              <a:t>Fourth level</a:t>
+            </a:r>
+          </a:p>
+          <a:p>
+            <a:pPr lvl="4"/>
+            <a:r>
+              <a:rPr lang="en-US" smtClean="0"/>
+              <a:t>Fifth level</a:t>
+            </a:r>
+            <a:endParaRPr lang="en-GB"/>
+          </a:p>
+        </p:txBody>
+      </p:sp>
+      <p:sp>
+        <p:nvSpPr>
+          <p:cNvPr id="6" name="Footer Placeholder 5"/>
+          <p:cNvSpPr>
+            <a:spLocks noGrp="1"/>
+          </p:cNvSpPr>
+          <p:nvPr>
+            <p:ph type="ftr" sz="quarter" idx="4"/>
+          </p:nvPr>
+        </p:nvSpPr>
+        <p:spPr>
+          <a:xfrm>
+            <a:off x="0" y="8685213"/>
+            <a:ext cx="2971800" cy="457200"/>
+          </a:xfrm>
+          <a:prstGeom prst="rect">
+            <a:avLst/>
+          </a:prstGeom>
+        </p:spPr>
+        <p:txBody>
+          <a:bodyPr vert="horz" lIns="91440" tIns="45720" rIns="91440" bIns="45720" rtlCol="0" anchor="b"/>
+          <a:lstStyle>
+            <a:lvl1pPr algn="l">
+              <a:defRPr sz="1200"/>
+            </a:lvl1pPr>
+          </a:lstStyle>
+          <a:p>
+            <a:endParaRPr lang="en-GB"/>
+          </a:p>
+        </p:txBody>
+      </p:sp>
+      <p:sp>
+        <p:nvSpPr>
+          <p:cNvPr id="7" name="Slide Number Placeholder 6"/>
+          <p:cNvSpPr>
+            <a:spLocks noGrp="1"/>
+          </p:cNvSpPr>
+          <p:nvPr>
+            <p:ph type="sldNum" sz="quarter" idx="5"/>
+          </p:nvPr>
+        </p:nvSpPr>
+        <p:spPr>
+          <a:xfrm>
+            <a:off x="3884613" y="8685213"/>
+            <a:ext cx="2971800" cy="457200"/>
+          </a:xfrm>
+          <a:prstGeom prst="rect">
+            <a:avLst/>
+          </a:prstGeom>
+        </p:spPr>
+        <p:txBody>
+          <a:bodyPr vert="horz" lIns="91440" tIns="45720" rIns="91440" bIns="45720" rtlCol="0" anchor="b"/>
+          <a:lstStyle>
+            <a:lvl1pPr algn="r">
+              <a:defRPr sz="1200"/>
+            </a:lvl1pPr>
+          </a:lstStyle>
+          <a:p>
+            <a:fld id="{19172BFF-A9D5-4236-9388-2135A8E6E631}" type="slidenum">
+              <a:rPr lang="en-GB" smtClean="0"/>
+              <a:t>‹#›</a:t>
+            </a:fld>
+            <a:endParaRPr lang="en-GB"/>
+          </a:p>
+        </p:txBody>
+      </p:sp>
+    </p:spTree>
+  </p:cSld>
+  <p:clrMap bg1="lt1" tx1="dk1" bg2="lt2" tx2="dk2" accent1="accent1" accent2="accent2" accent3="accent3" accent4="accent4" accent5="accent5" accent6="accent6" hlink="hlink" folHlink="folHlink"/>
+  <p:notesStyle>
+    <a:lvl1pPr marL="0" algn="l" defTabSz="914400" rtl="0" eaLnBrk="1" latinLnBrk="0" hangingPunct="1">
+      <a:defRPr sz="1200" kern="1200">
+        <a:solidFill>
+          <a:schemeClr val="tx1"/>
+        </a:solidFill>
+        <a:latin typeface="+mn-lt"/>
+        <a:ea typeface="+mn-ea"/>
+        <a:cs typeface="+mn-cs"/>
+      </a:defRPr>
+    </a:lvl1pPr>
+    <a:lvl2pPr marL="457200" algn="l" defTabSz="914400" rtl="0" eaLnBrk="1" latinLnBrk="0" hangingPunct="1">
+      <a:defRPr sz="1200" kern="1200">
+        <a:solidFill>
+          <a:schemeClr val="tx1"/>
+        </a:solidFill>
+        <a:latin typeface="+mn-lt"/>
+        <a:ea typeface="+mn-ea"/>
+        <a:cs typeface="+mn-cs"/>
+      </a:defRPr>
+    </a:lvl2pPr>
+    <a:lvl3pPr marL="914400" algn="l" defTabSz="914400" rtl="0" eaLnBrk="1" latinLnBrk="0" hangingPunct="1">
+      <a:defRPr sz="1200" kern="1200">
+        <a:solidFill>
+          <a:schemeClr val="tx1"/>
+        </a:solidFill>
+        <a:latin typeface="+mn-lt"/>
+        <a:ea typeface="+mn-ea"/>
+        <a:cs typeface="+mn-cs"/>
+      </a:defRPr>
+    </a:lvl3pPr>
+    <a:lvl4pPr marL="1371600" algn="l" defTabSz="914400" rtl="0" eaLnBrk="1" latinLnBrk="0" hangingPunct="1">
+      <a:defRPr sz="1200" kern="1200">
+        <a:solidFill>
+          <a:schemeClr val="tx1"/>
+        </a:solidFill>
+        <a:latin typeface="+mn-lt"/>
+        <a:ea typeface="+mn-ea"/>
+        <a:cs typeface="+mn-cs"/>
+      </a:defRPr>
+    </a:lvl4pPr>
+    <a:lvl5pPr marL="1828800" algn="l" defTabSz="914400" rtl="0" eaLnBrk="1" latinLnBrk="0" hangingPunct="1">
+      <a:defRPr sz="1200" kern="1200">
+        <a:solidFill>
+          <a:schemeClr val="tx1"/>
+        </a:solidFill>
+        <a:latin typeface="+mn-lt"/>
+        <a:ea typeface="+mn-ea"/>
+        <a:cs typeface="+mn-cs"/>
+      </a:defRPr>
+    </a:lvl5pPr>
+    <a:lvl6pPr marL="2286000" algn="l" defTabSz="914400" rtl="0" eaLnBrk="1" latinLnBrk="0" hangingPunct="1">
+      <a:defRPr sz="1200" kern="1200">
+        <a:solidFill>
+          <a:schemeClr val="tx1"/>
+        </a:solidFill>
+        <a:latin typeface="+mn-lt"/>
+        <a:ea typeface="+mn-ea"/>
+        <a:cs typeface="+mn-cs"/>
+      </a:defRPr>
+    </a:lvl6pPr>
+    <a:lvl7pPr marL="2743200" algn="l" defTabSz="914400" rtl="0" eaLnBrk="1" latinLnBrk="0" hangingPunct="1">
+      <a:defRPr sz="1200" kern="1200">
+        <a:solidFill>
+          <a:schemeClr val="tx1"/>
+        </a:solidFill>
+        <a:latin typeface="+mn-lt"/>
+        <a:ea typeface="+mn-ea"/>
+        <a:cs typeface="+mn-cs"/>
+      </a:defRPr>
+    </a:lvl7pPr>
+    <a:lvl8pPr marL="3200400" algn="l" defTabSz="914400" rtl="0" eaLnBrk="1" latinLnBrk="0" hangingPunct="1">
+      <a:defRPr sz="1200" kern="1200">
+        <a:solidFill>
+          <a:schemeClr val="tx1"/>
+        </a:solidFill>
+        <a:latin typeface="+mn-lt"/>
+        <a:ea typeface="+mn-ea"/>
+        <a:cs typeface="+mn-cs"/>
+      </a:defRPr>
+    </a:lvl8pPr>
+    <a:lvl9pPr marL="3657600" algn="l" defTabSz="914400" rtl="0" eaLnBrk="1" latinLnBrk="0" hangingPunct="1">
+      <a:defRPr sz="1200" kern="1200">
+        <a:solidFill>
+          <a:schemeClr val="tx1"/>
+        </a:solidFill>
+        <a:latin typeface="+mn-lt"/>
+        <a:ea typeface="+mn-ea"/>
+        <a:cs typeface="+mn-cs"/>
+      </a:defRPr>
+    </a:lvl9pPr>
+  </p:notesStyle>
+</p:notesMaster>
+</file>
+
+<file path=ppt/notesSlides/notesSlide1.xml><?xml version="1.0" encoding="utf-8"?>
+<p:notes xmlns:a="http://schemas.openxmlformats.org/drawingml/2006/main" xmlns:r="http://schemas.openxmlformats.org/officeDocument/2006/relationships" xmlns:p="http://schemas.openxmlformats.org/presentationml/2006/main">
+  <p:cSld>
+    <p:spTree>
+      <p:nvGrpSpPr>
+        <p:cNvPr id="1" name=""/>
+        <p:cNvGrpSpPr/>
+        <p:nvPr/>
+      </p:nvGrpSpPr>
+      <p:grpSpPr>
+        <a:xfrm>
+          <a:off x="0" y="0"/>
+          <a:ext cx="0" cy="0"/>
+          <a:chOff x="0" y="0"/>
+          <a:chExt cx="0" cy="0"/>
+        </a:xfrm>
+      </p:grpSpPr>
+      <p:sp>
+        <p:nvSpPr>
+          <p:cNvPr id="2" name="Slide Image Placeholder 1"/>
+          <p:cNvSpPr>
+            <a:spLocks noGrp="1" noRot="1" noChangeAspect="1"/>
+          </p:cNvSpPr>
+          <p:nvPr>
+            <p:ph type="sldImg"/>
+          </p:nvPr>
+        </p:nvSpPr>
+        <p:spPr/>
+      </p:sp>
+      <p:sp>
+        <p:nvSpPr>
+          <p:cNvPr id="3" name="Notes Placeholder 2"/>
+          <p:cNvSpPr>
+            <a:spLocks noGrp="1"/>
+          </p:cNvSpPr>
+          <p:nvPr>
+            <p:ph type="body" idx="1"/>
+          </p:nvPr>
+        </p:nvSpPr>
+        <p:spPr/>
+        <p:txBody>
+          <a:bodyPr>
+            <a:normAutofit/>
+          </a:bodyPr>
+          <a:lstStyle/>
+          <a:p>
+            <a:r>
+              <a:rPr lang="en-GB" dirty="0" smtClean="0"/>
+              <a:t>Thank ou for your time we will now awnser</a:t>
+            </a:r>
+            <a:r>
+              <a:rPr lang="en-GB" baseline="0" dirty="0" smtClean="0"/>
+              <a:t> any questions you have.</a:t>
+            </a:r>
+            <a:endParaRPr lang="en-GB" dirty="0"/>
+          </a:p>
+        </p:txBody>
+      </p:sp>
+      <p:sp>
+        <p:nvSpPr>
+          <p:cNvPr id="4" name="Slide Number Placeholder 3"/>
+          <p:cNvSpPr>
+            <a:spLocks noGrp="1"/>
+          </p:cNvSpPr>
+          <p:nvPr>
+            <p:ph type="sldNum" sz="quarter" idx="10"/>
+          </p:nvPr>
+        </p:nvSpPr>
+        <p:spPr/>
+        <p:txBody>
+          <a:bodyPr/>
+          <a:lstStyle/>
+          <a:p>
+            <a:fld id="{19172BFF-A9D5-4236-9388-2135A8E6E631}" type="slidenum">
+              <a:rPr lang="en-GB" smtClean="0"/>
+              <a:t>13</a:t>
+            </a:fld>
+            <a:endParaRPr lang="en-GB"/>
+          </a:p>
+        </p:txBody>
+      </p:sp>
+    </p:spTree>
+  </p:cSld>
+  <p:clrMapOvr>
+    <a:masterClrMapping/>
+  </p:clrMapOvr>
+</p:notes>
+</file>
+
 <file path=ppt/slideLayouts/slideLayout1.xml><?xml version="1.0" encoding="utf-8"?>
 <p:sldLayout xmlns:a="http://schemas.openxmlformats.org/drawingml/2006/main" xmlns:r="http://schemas.openxmlformats.org/officeDocument/2006/relationships" xmlns:p="http://schemas.openxmlformats.org/presentationml/2006/main" type="title" preserve="1">
   <p:cSld name="Title Slide">
@@ -292,7 +731,8 @@
           <a:p>
             <a:fld id="{2C598940-329B-448A-8A72-F3E6E1FE7A33}" type="datetimeFigureOut">
               <a:rPr lang="en-GB" smtClean="0"/>
-              <a:t>30/01/2017</a:t>
+              <a:pPr/>
+              <a:t>31/01/2017</a:t>
             </a:fld>
             <a:endParaRPr lang="en-GB"/>
           </a:p>
@@ -334,6 +774,7 @@
           <a:p>
             <a:fld id="{642E0A3D-A48E-4DFA-A3C0-57BDFC0CDF84}" type="slidenum">
               <a:rPr lang="en-GB" smtClean="0"/>
+              <a:pPr/>
               <a:t>‹#›</a:t>
             </a:fld>
             <a:endParaRPr lang="en-GB"/>
@@ -457,7 +898,8 @@
           <a:p>
             <a:fld id="{2C598940-329B-448A-8A72-F3E6E1FE7A33}" type="datetimeFigureOut">
               <a:rPr lang="en-GB" smtClean="0"/>
-              <a:t>30/01/2017</a:t>
+              <a:pPr/>
+              <a:t>31/01/2017</a:t>
             </a:fld>
             <a:endParaRPr lang="en-GB"/>
           </a:p>
@@ -499,6 +941,7 @@
           <a:p>
             <a:fld id="{642E0A3D-A48E-4DFA-A3C0-57BDFC0CDF84}" type="slidenum">
               <a:rPr lang="en-GB" smtClean="0"/>
+              <a:pPr/>
               <a:t>‹#›</a:t>
             </a:fld>
             <a:endParaRPr lang="en-GB"/>
@@ -632,7 +1075,8 @@
           <a:p>
             <a:fld id="{2C598940-329B-448A-8A72-F3E6E1FE7A33}" type="datetimeFigureOut">
               <a:rPr lang="en-GB" smtClean="0"/>
-              <a:t>30/01/2017</a:t>
+              <a:pPr/>
+              <a:t>31/01/2017</a:t>
             </a:fld>
             <a:endParaRPr lang="en-GB"/>
           </a:p>
@@ -674,6 +1118,7 @@
           <a:p>
             <a:fld id="{642E0A3D-A48E-4DFA-A3C0-57BDFC0CDF84}" type="slidenum">
               <a:rPr lang="en-GB" smtClean="0"/>
+              <a:pPr/>
               <a:t>‹#›</a:t>
             </a:fld>
             <a:endParaRPr lang="en-GB"/>
@@ -797,7 +1242,8 @@
           <a:p>
             <a:fld id="{2C598940-329B-448A-8A72-F3E6E1FE7A33}" type="datetimeFigureOut">
               <a:rPr lang="en-GB" smtClean="0"/>
-              <a:t>30/01/2017</a:t>
+              <a:pPr/>
+              <a:t>31/01/2017</a:t>
             </a:fld>
             <a:endParaRPr lang="en-GB"/>
           </a:p>
@@ -839,6 +1285,7 @@
           <a:p>
             <a:fld id="{642E0A3D-A48E-4DFA-A3C0-57BDFC0CDF84}" type="slidenum">
               <a:rPr lang="en-GB" smtClean="0"/>
+              <a:pPr/>
               <a:t>‹#›</a:t>
             </a:fld>
             <a:endParaRPr lang="en-GB"/>
@@ -1039,7 +1486,8 @@
           <a:p>
             <a:fld id="{2C598940-329B-448A-8A72-F3E6E1FE7A33}" type="datetimeFigureOut">
               <a:rPr lang="en-GB" smtClean="0"/>
-              <a:t>30/01/2017</a:t>
+              <a:pPr/>
+              <a:t>31/01/2017</a:t>
             </a:fld>
             <a:endParaRPr lang="en-GB"/>
           </a:p>
@@ -1081,6 +1529,7 @@
           <a:p>
             <a:fld id="{642E0A3D-A48E-4DFA-A3C0-57BDFC0CDF84}" type="slidenum">
               <a:rPr lang="en-GB" smtClean="0"/>
+              <a:pPr/>
               <a:t>‹#›</a:t>
             </a:fld>
             <a:endParaRPr lang="en-GB"/>
@@ -1303,7 +1752,8 @@
           <a:p>
             <a:fld id="{2C598940-329B-448A-8A72-F3E6E1FE7A33}" type="datetimeFigureOut">
               <a:rPr lang="en-GB" smtClean="0"/>
-              <a:t>30/01/2017</a:t>
+              <a:pPr/>
+              <a:t>31/01/2017</a:t>
             </a:fld>
             <a:endParaRPr lang="en-GB"/>
           </a:p>
@@ -1345,6 +1795,7 @@
           <a:p>
             <a:fld id="{642E0A3D-A48E-4DFA-A3C0-57BDFC0CDF84}" type="slidenum">
               <a:rPr lang="en-GB" smtClean="0"/>
+              <a:pPr/>
               <a:t>‹#›</a:t>
             </a:fld>
             <a:endParaRPr lang="en-GB"/>
@@ -1681,7 +2132,8 @@
           <a:p>
             <a:fld id="{2C598940-329B-448A-8A72-F3E6E1FE7A33}" type="datetimeFigureOut">
               <a:rPr lang="en-GB" smtClean="0"/>
-              <a:t>30/01/2017</a:t>
+              <a:pPr/>
+              <a:t>31/01/2017</a:t>
             </a:fld>
             <a:endParaRPr lang="en-GB"/>
           </a:p>
@@ -1723,6 +2175,7 @@
           <a:p>
             <a:fld id="{642E0A3D-A48E-4DFA-A3C0-57BDFC0CDF84}" type="slidenum">
               <a:rPr lang="en-GB" smtClean="0"/>
+              <a:pPr/>
               <a:t>‹#›</a:t>
             </a:fld>
             <a:endParaRPr lang="en-GB"/>
@@ -1831,7 +2284,8 @@
           <a:p>
             <a:fld id="{2C598940-329B-448A-8A72-F3E6E1FE7A33}" type="datetimeFigureOut">
               <a:rPr lang="en-GB" smtClean="0"/>
-              <a:t>30/01/2017</a:t>
+              <a:pPr/>
+              <a:t>31/01/2017</a:t>
             </a:fld>
             <a:endParaRPr lang="en-GB"/>
           </a:p>
@@ -1873,6 +2327,7 @@
           <a:p>
             <a:fld id="{642E0A3D-A48E-4DFA-A3C0-57BDFC0CDF84}" type="slidenum">
               <a:rPr lang="en-GB" smtClean="0"/>
+              <a:pPr/>
               <a:t>‹#›</a:t>
             </a:fld>
             <a:endParaRPr lang="en-GB"/>
@@ -1921,7 +2376,8 @@
           <a:p>
             <a:fld id="{2C598940-329B-448A-8A72-F3E6E1FE7A33}" type="datetimeFigureOut">
               <a:rPr lang="en-GB" smtClean="0"/>
-              <a:t>30/01/2017</a:t>
+              <a:pPr/>
+              <a:t>31/01/2017</a:t>
             </a:fld>
             <a:endParaRPr lang="en-GB"/>
           </a:p>
@@ -1963,6 +2419,7 @@
           <a:p>
             <a:fld id="{642E0A3D-A48E-4DFA-A3C0-57BDFC0CDF84}" type="slidenum">
               <a:rPr lang="en-GB" smtClean="0"/>
+              <a:pPr/>
               <a:t>‹#›</a:t>
             </a:fld>
             <a:endParaRPr lang="en-GB"/>
@@ -2182,7 +2639,8 @@
           <a:p>
             <a:fld id="{2C598940-329B-448A-8A72-F3E6E1FE7A33}" type="datetimeFigureOut">
               <a:rPr lang="en-GB" smtClean="0"/>
-              <a:t>30/01/2017</a:t>
+              <a:pPr/>
+              <a:t>31/01/2017</a:t>
             </a:fld>
             <a:endParaRPr lang="en-GB"/>
           </a:p>
@@ -2224,6 +2682,7 @@
           <a:p>
             <a:fld id="{642E0A3D-A48E-4DFA-A3C0-57BDFC0CDF84}" type="slidenum">
               <a:rPr lang="en-GB" smtClean="0"/>
+              <a:pPr/>
               <a:t>‹#›</a:t>
             </a:fld>
             <a:endParaRPr lang="en-GB"/>
@@ -2470,7 +2929,8 @@
           <a:p>
             <a:fld id="{2C598940-329B-448A-8A72-F3E6E1FE7A33}" type="datetimeFigureOut">
               <a:rPr lang="en-GB" smtClean="0"/>
-              <a:t>30/01/2017</a:t>
+              <a:pPr/>
+              <a:t>31/01/2017</a:t>
             </a:fld>
             <a:endParaRPr lang="en-GB"/>
           </a:p>
@@ -2517,6 +2977,7 @@
           <a:p>
             <a:fld id="{642E0A3D-A48E-4DFA-A3C0-57BDFC0CDF84}" type="slidenum">
               <a:rPr lang="en-GB" smtClean="0"/>
+              <a:pPr/>
               <a:t>‹#›</a:t>
             </a:fld>
             <a:endParaRPr lang="en-GB"/>
@@ -3241,7 +3702,8 @@
           <a:p>
             <a:fld id="{2C598940-329B-448A-8A72-F3E6E1FE7A33}" type="datetimeFigureOut">
               <a:rPr lang="en-GB" smtClean="0"/>
-              <a:t>30/01/2017</a:t>
+              <a:pPr/>
+              <a:t>31/01/2017</a:t>
             </a:fld>
             <a:endParaRPr lang="en-GB"/>
           </a:p>
@@ -3319,6 +3781,7 @@
           <a:p>
             <a:fld id="{642E0A3D-A48E-4DFA-A3C0-57BDFC0CDF84}" type="slidenum">
               <a:rPr lang="en-GB" smtClean="0"/>
+              <a:pPr/>
               <a:t>‹#›</a:t>
             </a:fld>
             <a:endParaRPr lang="en-GB"/>
@@ -3871,7 +4334,7 @@
         </p:nvSpPr>
         <p:spPr>
           <a:xfrm>
-            <a:off x="683568" y="980728"/>
+            <a:off x="683568" y="1340768"/>
             <a:ext cx="7772400" cy="1470025"/>
           </a:xfrm>
         </p:spPr>
@@ -3901,8 +4364,8 @@
         </p:nvSpPr>
         <p:spPr>
           <a:xfrm>
-            <a:off x="2051720" y="2852936"/>
-            <a:ext cx="6400800" cy="3096344"/>
+            <a:off x="2051720" y="3429000"/>
+            <a:ext cx="6400800" cy="2448272"/>
           </a:xfrm>
         </p:spPr>
         <p:txBody>
@@ -3979,46 +4442,64 @@
           <a:p>
             <a:r>
               <a:rPr lang="en-GB" dirty="0" smtClean="0"/>
-              <a:t>Prototype + Playtesting</a:t>
+              <a:t>Prototype</a:t>
             </a:r>
             <a:endParaRPr lang="en-GB" dirty="0"/>
           </a:p>
         </p:txBody>
       </p:sp>
-      <p:sp>
-        <p:nvSpPr>
-          <p:cNvPr id="3" name="Content Placeholder 2"/>
-          <p:cNvSpPr>
-            <a:spLocks noGrp="1"/>
-          </p:cNvSpPr>
-          <p:nvPr>
-            <p:ph idx="1"/>
-          </p:nvPr>
-        </p:nvSpPr>
-        <p:spPr/>
-        <p:txBody>
-          <a:bodyPr/>
-          <a:lstStyle/>
-          <a:p>
-            <a:r>
-              <a:rPr lang="en-GB" dirty="0" smtClean="0"/>
-              <a:t>(gif of prototype)</a:t>
-            </a:r>
-          </a:p>
-          <a:p>
-            <a:r>
-              <a:rPr lang="en-GB" dirty="0" smtClean="0"/>
-              <a:t>(playtesting results)</a:t>
-            </a:r>
-            <a:endParaRPr lang="en-GB" dirty="0"/>
-          </a:p>
-        </p:txBody>
-      </p:sp>
+      <p:pic>
+        <p:nvPicPr>
+          <p:cNvPr id="4" name="Picture 3" descr="Prototype.gif"/>
+          <p:cNvPicPr>
+            <a:picLocks noChangeAspect="1"/>
+          </p:cNvPicPr>
+          <p:nvPr/>
+        </p:nvPicPr>
+        <p:blipFill>
+          <a:blip r:embed="rId2" cstate="print"/>
+          <a:stretch>
+            <a:fillRect/>
+          </a:stretch>
+        </p:blipFill>
+        <p:spPr>
+          <a:xfrm>
+            <a:off x="395536" y="2348880"/>
+            <a:ext cx="8283273" cy="3456384"/>
+          </a:xfrm>
+          <a:prstGeom prst="rect">
+            <a:avLst/>
+          </a:prstGeom>
+        </p:spPr>
+        <p:style>
+          <a:lnRef idx="2">
+            <a:schemeClr val="dk1">
+              <a:shade val="50000"/>
+            </a:schemeClr>
+          </a:lnRef>
+          <a:fillRef idx="1">
+            <a:schemeClr val="dk1"/>
+          </a:fillRef>
+          <a:effectRef idx="0">
+            <a:schemeClr val="dk1"/>
+          </a:effectRef>
+          <a:fontRef idx="minor">
+            <a:schemeClr val="lt1"/>
+          </a:fontRef>
+        </p:style>
+      </p:pic>
     </p:spTree>
   </p:cSld>
   <p:clrMapOvr>
     <a:masterClrMapping/>
   </p:clrMapOvr>
+  <p:timing>
+    <p:tnLst>
+      <p:par>
+        <p:cTn id="1" dur="indefinite" restart="never" nodeType="tmRoot"/>
+      </p:par>
+    </p:tnLst>
+  </p:timing>
 </p:sld>
 </file>
 
@@ -4056,7 +4537,7 @@
           <a:p>
             <a:r>
               <a:rPr lang="en-GB" dirty="0" smtClean="0"/>
-              <a:t>Iterative Process</a:t>
+              <a:t>Playtesting results</a:t>
             </a:r>
             <a:endParaRPr lang="en-GB" dirty="0"/>
           </a:p>
@@ -4079,9 +4560,40 @@
           <a:p>
             <a:r>
               <a:rPr lang="en-GB" dirty="0" smtClean="0"/>
-              <a:t>(potential iterations we’ve come up with)</a:t>
-            </a:r>
-            <a:endParaRPr lang="en-GB" dirty="0"/>
+              <a:t>Smiling</a:t>
+            </a:r>
+          </a:p>
+          <a:p>
+            <a:r>
+              <a:rPr lang="en-GB" dirty="0" smtClean="0"/>
+              <a:t>C</a:t>
+            </a:r>
+            <a:r>
+              <a:rPr lang="en-GB" dirty="0" smtClean="0"/>
+              <a:t>elebration</a:t>
+            </a:r>
+          </a:p>
+          <a:p>
+            <a:r>
+              <a:rPr lang="en-GB" dirty="0" smtClean="0"/>
+              <a:t>Schadenfreude</a:t>
+            </a:r>
+          </a:p>
+          <a:p>
+            <a:r>
+              <a:rPr lang="en-GB" dirty="0" smtClean="0"/>
+              <a:t>Annoyance at opponent (when very close)</a:t>
+            </a:r>
+          </a:p>
+          <a:p>
+            <a:endParaRPr lang="en-GB" dirty="0" smtClean="0"/>
+          </a:p>
+          <a:p>
+            <a:r>
+              <a:rPr lang="en-GB" b="1" dirty="0" smtClean="0"/>
+              <a:t>[ROSS PUT YOUTUBE LINK HERE]</a:t>
+            </a:r>
+            <a:endParaRPr lang="en-GB" b="1" dirty="0"/>
           </a:p>
         </p:txBody>
       </p:sp>
@@ -4090,6 +4602,13 @@
   <p:clrMapOvr>
     <a:masterClrMapping/>
   </p:clrMapOvr>
+  <p:timing>
+    <p:tnLst>
+      <p:par>
+        <p:cTn id="1" dur="indefinite" restart="never" nodeType="tmRoot"/>
+      </p:par>
+    </p:tnLst>
+  </p:timing>
 </p:sld>
 </file>
 
@@ -4183,47 +4702,75 @@
       </p:grpSpPr>
       <p:sp>
         <p:nvSpPr>
-          <p:cNvPr id="2" name="Title 1"/>
-          <p:cNvSpPr>
-            <a:spLocks noGrp="1"/>
-          </p:cNvSpPr>
-          <p:nvPr>
-            <p:ph type="title"/>
-          </p:nvPr>
-        </p:nvSpPr>
-        <p:spPr/>
-        <p:txBody>
-          <a:bodyPr/>
-          <a:lstStyle/>
-          <a:p>
-            <a:r>
-              <a:rPr lang="en-GB" dirty="0" smtClean="0"/>
-              <a:t>Thank You</a:t>
-            </a:r>
-            <a:endParaRPr lang="en-GB" dirty="0"/>
-          </a:p>
-        </p:txBody>
-      </p:sp>
-      <p:sp>
-        <p:nvSpPr>
-          <p:cNvPr id="3" name="Content Placeholder 2"/>
-          <p:cNvSpPr>
-            <a:spLocks noGrp="1"/>
-          </p:cNvSpPr>
-          <p:nvPr>
-            <p:ph idx="1"/>
-          </p:nvPr>
-        </p:nvSpPr>
-        <p:spPr/>
-        <p:txBody>
-          <a:bodyPr/>
-          <a:lstStyle/>
-          <a:p>
-            <a:r>
-              <a:rPr lang="en-GB" dirty="0" smtClean="0"/>
-              <a:t>Any questions?</a:t>
-            </a:r>
-            <a:endParaRPr lang="en-GB" dirty="0"/>
+          <p:cNvPr id="5" name="Title 1"/>
+          <p:cNvSpPr txBox="1">
+            <a:spLocks/>
+          </p:cNvSpPr>
+          <p:nvPr/>
+        </p:nvSpPr>
+        <p:spPr>
+          <a:xfrm>
+            <a:off x="2915816" y="2564904"/>
+            <a:ext cx="3384376" cy="1143000"/>
+          </a:xfrm>
+          <a:prstGeom prst="rect">
+            <a:avLst/>
+          </a:prstGeom>
+        </p:spPr>
+        <p:txBody>
+          <a:bodyPr vert="horz" lIns="0" rIns="0" bIns="0" anchor="b">
+            <a:normAutofit/>
+          </a:bodyPr>
+          <a:lstStyle/>
+          <a:p>
+            <a:pPr marL="0" marR="0" lvl="0" indent="0" algn="l" defTabSz="914400" rtl="0" eaLnBrk="1" fontAlgn="auto" latinLnBrk="0" hangingPunct="1">
+              <a:lnSpc>
+                <a:spcPct val="100000"/>
+              </a:lnSpc>
+              <a:spcBef>
+                <a:spcPct val="0"/>
+              </a:spcBef>
+              <a:spcAft>
+                <a:spcPts val="0"/>
+              </a:spcAft>
+              <a:buClrTx/>
+              <a:buSzTx/>
+              <a:buFontTx/>
+              <a:buNone/>
+              <a:tabLst/>
+              <a:defRPr/>
+            </a:pPr>
+            <a:r>
+              <a:rPr kumimoji="0" lang="en-GB" sz="5000" b="0" i="0" u="none" strike="noStrike" kern="1200" cap="none" spc="0" normalizeH="0" baseline="0" noProof="0" dirty="0" smtClean="0">
+                <a:ln>
+                  <a:noFill/>
+                </a:ln>
+                <a:solidFill>
+                  <a:schemeClr val="tx2"/>
+                </a:solidFill>
+                <a:effectLst/>
+                <a:uLnTx/>
+                <a:uFillTx/>
+                <a:latin typeface="+mj-lt"/>
+                <a:ea typeface="+mj-ea"/>
+                <a:cs typeface="+mj-cs"/>
+              </a:rPr>
+              <a:t>Questions?</a:t>
+            </a:r>
+            <a:endParaRPr kumimoji="0" lang="en-GB" sz="5000" b="0" i="0" u="none" strike="noStrike" kern="1200" cap="none" spc="0" normalizeH="0" baseline="0" noProof="0" dirty="0">
+              <a:ln>
+                <a:noFill/>
+              </a:ln>
+              <a:solidFill>
+                <a:schemeClr val="tx2"/>
+              </a:solidFill>
+              <a:effectLst/>
+              <a:uLnTx/>
+              <a:uFillTx/>
+              <a:latin typeface="+mj-lt"/>
+              <a:ea typeface="+mj-ea"/>
+              <a:cs typeface="+mj-cs"/>
+            </a:endParaRPr>
           </a:p>
         </p:txBody>
       </p:sp>
@@ -4268,12 +4815,8 @@
           <a:lstStyle/>
           <a:p>
             <a:r>
-              <a:rPr lang="en-GB" sz="5400" dirty="0" smtClean="0"/>
-              <a:t>Skid Mark </a:t>
-            </a:r>
-            <a:r>
-              <a:rPr lang="en-GB" sz="5400" dirty="0" smtClean="0"/>
-              <a:t>(wip)</a:t>
+              <a:rPr lang="en-GB" dirty="0" smtClean="0"/>
+              <a:t>Brief Summary</a:t>
             </a:r>
             <a:endParaRPr lang="en-GB" dirty="0"/>
           </a:p>
@@ -4294,9 +4837,48 @@
           <a:bodyPr/>
           <a:lstStyle/>
           <a:p>
+            <a:pPr>
+              <a:buNone/>
+            </a:pPr>
+            <a:r>
+              <a:rPr lang="en-GB" b="1" dirty="0" smtClean="0"/>
+              <a:t>Constraints</a:t>
+            </a:r>
+          </a:p>
+          <a:p>
             <a:r>
               <a:rPr lang="en-GB" dirty="0" smtClean="0"/>
-              <a:t>(logline)</a:t>
+              <a:t>2D Environment</a:t>
+            </a:r>
+          </a:p>
+          <a:p>
+            <a:r>
+              <a:rPr lang="en-GB" dirty="0" smtClean="0"/>
+              <a:t>Physics based mechanic</a:t>
+            </a:r>
+          </a:p>
+          <a:p>
+            <a:r>
+              <a:rPr lang="en-GB" dirty="0" smtClean="0"/>
+              <a:t>Adversarial</a:t>
+            </a:r>
+          </a:p>
+          <a:p>
+            <a:r>
+              <a:rPr lang="en-GB" dirty="0" smtClean="0"/>
+              <a:t>Played on a single device</a:t>
+            </a:r>
+          </a:p>
+          <a:p>
+            <a:r>
+              <a:rPr lang="en-GB" dirty="0" smtClean="0"/>
+              <a:t>Symmetric </a:t>
+            </a:r>
+          </a:p>
+          <a:p>
+            <a:r>
+              <a:rPr lang="en-GB" dirty="0" smtClean="0"/>
+              <a:t>Simple rules</a:t>
             </a:r>
             <a:endParaRPr lang="en-GB" dirty="0"/>
           </a:p>
@@ -4343,36 +4925,167 @@
           <a:lstStyle/>
           <a:p>
             <a:r>
+              <a:rPr lang="en-GB" sz="5400" dirty="0" smtClean="0"/>
+              <a:t>Game Ideas</a:t>
+            </a:r>
+            <a:endParaRPr lang="en-GB" dirty="0"/>
+          </a:p>
+        </p:txBody>
+      </p:sp>
+      <p:sp>
+        <p:nvSpPr>
+          <p:cNvPr id="3" name="Content Placeholder 2"/>
+          <p:cNvSpPr>
+            <a:spLocks noGrp="1"/>
+          </p:cNvSpPr>
+          <p:nvPr>
+            <p:ph idx="1"/>
+          </p:nvPr>
+        </p:nvSpPr>
+        <p:spPr/>
+        <p:txBody>
+          <a:bodyPr/>
+          <a:lstStyle/>
+          <a:p>
+            <a:r>
               <a:rPr lang="en-GB" dirty="0" smtClean="0"/>
-              <a:t>Brief Summary</a:t>
-            </a:r>
+              <a:t>Friction</a:t>
+            </a:r>
+          </a:p>
+          <a:p>
+            <a:endParaRPr lang="en-GB" dirty="0" smtClean="0"/>
+          </a:p>
+          <a:p>
+            <a:endParaRPr lang="en-GB" dirty="0" smtClean="0"/>
+          </a:p>
+          <a:p>
+            <a:r>
+              <a:rPr lang="en-GB" dirty="0" smtClean="0"/>
+              <a:t>Buoyancy</a:t>
+            </a:r>
+          </a:p>
+          <a:p>
+            <a:pPr>
+              <a:buNone/>
+            </a:pPr>
+            <a:endParaRPr lang="en-GB" dirty="0" smtClean="0"/>
+          </a:p>
+          <a:p>
+            <a:endParaRPr lang="en-GB" dirty="0" smtClean="0"/>
+          </a:p>
+          <a:p>
+            <a:r>
+              <a:rPr lang="en-GB" dirty="0" smtClean="0"/>
+              <a:t>Gravity</a:t>
+            </a:r>
+          </a:p>
+          <a:p>
+            <a:pPr>
+              <a:buNone/>
+            </a:pPr>
             <a:endParaRPr lang="en-GB" dirty="0"/>
           </a:p>
         </p:txBody>
       </p:sp>
-      <p:sp>
-        <p:nvSpPr>
-          <p:cNvPr id="3" name="Content Placeholder 2"/>
-          <p:cNvSpPr>
-            <a:spLocks noGrp="1"/>
-          </p:cNvSpPr>
-          <p:nvPr>
-            <p:ph idx="1"/>
-          </p:nvPr>
-        </p:nvSpPr>
-        <p:spPr/>
-        <p:txBody>
-          <a:bodyPr/>
-          <a:lstStyle/>
-          <a:p>
-            <a:r>
-              <a:rPr lang="en-GB" dirty="0" smtClean="0"/>
-              <a:t>(our constraints etc.)</a:t>
-            </a:r>
-            <a:endParaRPr lang="en-GB" dirty="0"/>
-          </a:p>
-        </p:txBody>
-      </p:sp>
+      <p:pic>
+        <p:nvPicPr>
+          <p:cNvPr id="13314" name="Picture 2" descr="http://www.school-for-champions.com/science/images/friction_uses_bear_slips.jpg"/>
+          <p:cNvPicPr>
+            <a:picLocks noChangeAspect="1" noChangeArrowheads="1"/>
+          </p:cNvPicPr>
+          <p:nvPr/>
+        </p:nvPicPr>
+        <p:blipFill>
+          <a:blip r:embed="rId2" cstate="print"/>
+          <a:srcRect/>
+          <a:stretch>
+            <a:fillRect/>
+          </a:stretch>
+        </p:blipFill>
+        <p:spPr bwMode="auto">
+          <a:xfrm>
+            <a:off x="6300192" y="1196752"/>
+            <a:ext cx="2204913" cy="1584176"/>
+          </a:xfrm>
+          <a:prstGeom prst="rect">
+            <a:avLst/>
+          </a:prstGeom>
+          <a:noFill/>
+          <a:ln>
+            <a:solidFill>
+              <a:schemeClr val="accent1">
+                <a:lumMod val="75000"/>
+              </a:schemeClr>
+            </a:solidFill>
+          </a:ln>
+        </p:spPr>
+      </p:pic>
+      <p:pic>
+        <p:nvPicPr>
+          <p:cNvPr id="13318" name="Picture 6" descr="https://www.colourbox.com/preview/5429543-apple-falling-to-hands.jpg"/>
+          <p:cNvPicPr>
+            <a:picLocks noChangeAspect="1" noChangeArrowheads="1"/>
+          </p:cNvPicPr>
+          <p:nvPr/>
+        </p:nvPicPr>
+        <p:blipFill>
+          <a:blip r:embed="rId3" cstate="print"/>
+          <a:srcRect/>
+          <a:stretch>
+            <a:fillRect/>
+          </a:stretch>
+        </p:blipFill>
+        <p:spPr bwMode="auto">
+          <a:xfrm>
+            <a:off x="6300192" y="3861048"/>
+            <a:ext cx="2160240" cy="2634439"/>
+          </a:xfrm>
+          <a:prstGeom prst="rect">
+            <a:avLst/>
+          </a:prstGeom>
+          <a:noFill/>
+          <a:ln>
+            <a:solidFill>
+              <a:schemeClr val="accent1">
+                <a:lumMod val="75000"/>
+              </a:schemeClr>
+            </a:solidFill>
+          </a:ln>
+        </p:spPr>
+      </p:pic>
+      <p:pic>
+        <p:nvPicPr>
+          <p:cNvPr id="13316" name="Picture 4" descr="Image result for rubber duck"/>
+          <p:cNvPicPr>
+            <a:picLocks noChangeAspect="1" noChangeArrowheads="1"/>
+          </p:cNvPicPr>
+          <p:nvPr/>
+        </p:nvPicPr>
+        <p:blipFill>
+          <a:blip r:embed="rId4" cstate="print"/>
+          <a:srcRect/>
+          <a:stretch>
+            <a:fillRect/>
+          </a:stretch>
+        </p:blipFill>
+        <p:spPr bwMode="auto">
+          <a:xfrm>
+            <a:off x="4139952" y="2564904"/>
+            <a:ext cx="2936604" cy="1957736"/>
+          </a:xfrm>
+          <a:prstGeom prst="rect">
+            <a:avLst/>
+          </a:prstGeom>
+          <a:noFill/>
+          <a:ln>
+            <a:solidFill>
+              <a:schemeClr val="accent1">
+                <a:lumMod val="75000"/>
+              </a:schemeClr>
+            </a:solidFill>
+          </a:ln>
+        </p:spPr>
+      </p:pic>
     </p:spTree>
   </p:cSld>
   <p:clrMapOvr>
@@ -4415,7 +5128,7 @@
           <a:p>
             <a:r>
               <a:rPr lang="en-GB" dirty="0" smtClean="0"/>
-              <a:t>Mechanics</a:t>
+              <a:t>Mechanics - Friction</a:t>
             </a:r>
             <a:endParaRPr lang="en-GB" dirty="0"/>
           </a:p>
@@ -4438,8 +5151,22 @@
           <a:p>
             <a:r>
               <a:rPr lang="en-GB" dirty="0" smtClean="0"/>
-              <a:t>(how game works &amp; mechanics chosen)</a:t>
-            </a:r>
+              <a:t>Timing mechanic</a:t>
+            </a:r>
+          </a:p>
+          <a:p>
+            <a:r>
+              <a:rPr lang="en-GB" dirty="0" smtClean="0"/>
+              <a:t>Both players have a key press</a:t>
+            </a:r>
+          </a:p>
+          <a:p>
+            <a:r>
+              <a:rPr lang="en-GB" dirty="0" smtClean="0"/>
+              <a:t>Upon key press, that player’s character momentum will stop.</a:t>
+            </a:r>
+          </a:p>
+          <a:p>
             <a:endParaRPr lang="en-GB" dirty="0"/>
           </a:p>
         </p:txBody>
@@ -4486,7 +5213,7 @@
           <a:p>
             <a:r>
               <a:rPr lang="en-GB" dirty="0" smtClean="0"/>
-              <a:t>Research + Demographic</a:t>
+              <a:t>Iterations</a:t>
             </a:r>
             <a:endParaRPr lang="en-GB" dirty="0"/>
           </a:p>
@@ -4509,20 +5236,399 @@
           <a:p>
             <a:r>
               <a:rPr lang="en-GB" dirty="0" smtClean="0"/>
-              <a:t>(what research into games showed)</a:t>
+              <a:t>The increasing and decreasing of friction.</a:t>
             </a:r>
           </a:p>
           <a:p>
             <a:r>
               <a:rPr lang="en-GB" dirty="0" smtClean="0"/>
-              <a:t>(demographic correlations of said games)</a:t>
+              <a:t>The movement of the end goal.</a:t>
             </a:r>
           </a:p>
           <a:p>
             <a:r>
               <a:rPr lang="en-GB" dirty="0" smtClean="0"/>
-              <a:t>(our demographic as a result of this research)</a:t>
-            </a:r>
+              <a:t>Player character also effecting the friction.</a:t>
+            </a:r>
+          </a:p>
+          <a:p>
+            <a:r>
+              <a:rPr lang="en-GB" dirty="0" smtClean="0"/>
+              <a:t>Instant stop or slow stop</a:t>
+            </a:r>
+          </a:p>
+          <a:p>
+            <a:endParaRPr lang="en-GB" dirty="0"/>
+          </a:p>
+        </p:txBody>
+      </p:sp>
+      <p:sp>
+        <p:nvSpPr>
+          <p:cNvPr id="1026" name="AutoShape 2" descr="https://outlook.office365.com/owa/service.svc/s/GetReferenceAttachment?attachmentId=AAMkAGQ5YjkxMGNhLTRiMTktNGI5YS1iZGY5LWM1ZDAwODVhNTY0MABGAAAAAADCPDluhWbpQ6vd7I4k%2FTV5BwALTIp3P9kfS6EnwdAW3fOtAAAB8bkwAAA%2BNlIClHVwR7TMt4h0ZItkAAFXs%2FL0AAABEgAQAJy%2BeZR3a4BGoXtwlPOWFRM%3D&amp;location=https%3A%2F%2Fccucsac-my.sharepoint.com%2Fpersonal%2Fs176778_ucs_ac_uk%2FDocuments%2FEmail%2520attachments%2Fmemeylines.png&amp;permissionLevel=1&amp;X-OWA-CANARY=0ay77dilGkGgsELkTkLaNzCS16McStQYGYoRyjvk8QMfKRiP1yA6lntIRerMdSW7k72Y68Tfs_w.&amp;isImagePreview=True"/>
+          <p:cNvSpPr>
+            <a:spLocks noChangeAspect="1" noChangeArrowheads="1"/>
+          </p:cNvSpPr>
+          <p:nvPr/>
+        </p:nvSpPr>
+        <p:spPr bwMode="auto">
+          <a:xfrm>
+            <a:off x="155575" y="-144463"/>
+            <a:ext cx="304800" cy="304801"/>
+          </a:xfrm>
+          <a:prstGeom prst="rect">
+            <a:avLst/>
+          </a:prstGeom>
+          <a:noFill/>
+        </p:spPr>
+        <p:txBody>
+          <a:bodyPr vert="horz" wrap="square" lIns="91440" tIns="45720" rIns="91440" bIns="45720" numCol="1" anchor="t" anchorCtr="0" compatLnSpc="1">
+            <a:prstTxWarp prst="textNoShape">
+              <a:avLst/>
+            </a:prstTxWarp>
+          </a:bodyPr>
+          <a:lstStyle/>
+          <a:p>
+            <a:endParaRPr lang="en-GB"/>
+          </a:p>
+        </p:txBody>
+      </p:sp>
+      <p:sp>
+        <p:nvSpPr>
+          <p:cNvPr id="1028" name="AutoShape 4" descr="https://outlook.office365.com/owa/service.svc/s/GetReferenceAttachment?attachmentId=AAMkAGQ5YjkxMGNhLTRiMTktNGI5YS1iZGY5LWM1ZDAwODVhNTY0MABGAAAAAADCPDluhWbpQ6vd7I4k%2FTV5BwALTIp3P9kfS6EnwdAW3fOtAAAB8bkwAAA%2BNlIClHVwR7TMt4h0ZItkAAFXs%2FL0AAABEgAQAJy%2BeZR3a4BGoXtwlPOWFRM%3D&amp;location=https%3A%2F%2Fccucsac-my.sharepoint.com%2Fpersonal%2Fs176778_ucs_ac_uk%2FDocuments%2FEmail%2520attachments%2Fmemeylines.png&amp;permissionLevel=1&amp;X-OWA-CANARY=0ay77dilGkGgsELkTkLaNzCS16McStQYGYoRyjvk8QMfKRiP1yA6lntIRerMdSW7k72Y68Tfs_w.&amp;isImagePreview=True"/>
+          <p:cNvSpPr>
+            <a:spLocks noChangeAspect="1" noChangeArrowheads="1"/>
+          </p:cNvSpPr>
+          <p:nvPr/>
+        </p:nvSpPr>
+        <p:spPr bwMode="auto">
+          <a:xfrm>
+            <a:off x="155575" y="-144463"/>
+            <a:ext cx="304800" cy="304801"/>
+          </a:xfrm>
+          <a:prstGeom prst="rect">
+            <a:avLst/>
+          </a:prstGeom>
+          <a:noFill/>
+        </p:spPr>
+        <p:txBody>
+          <a:bodyPr vert="horz" wrap="square" lIns="91440" tIns="45720" rIns="91440" bIns="45720" numCol="1" anchor="t" anchorCtr="0" compatLnSpc="1">
+            <a:prstTxWarp prst="textNoShape">
+              <a:avLst/>
+            </a:prstTxWarp>
+          </a:bodyPr>
+          <a:lstStyle/>
+          <a:p>
+            <a:endParaRPr lang="en-GB"/>
+          </a:p>
+        </p:txBody>
+      </p:sp>
+      <p:pic>
+        <p:nvPicPr>
+          <p:cNvPr id="6" name="Picture 5" descr="memeylines.png"/>
+          <p:cNvPicPr>
+            <a:picLocks noChangeAspect="1"/>
+          </p:cNvPicPr>
+          <p:nvPr/>
+        </p:nvPicPr>
+        <p:blipFill>
+          <a:blip r:embed="rId2" cstate="print"/>
+          <a:stretch>
+            <a:fillRect/>
+          </a:stretch>
+        </p:blipFill>
+        <p:spPr>
+          <a:xfrm>
+            <a:off x="683568" y="4581128"/>
+            <a:ext cx="8028384" cy="2020857"/>
+          </a:xfrm>
+          <a:prstGeom prst="rect">
+            <a:avLst/>
+          </a:prstGeom>
+        </p:spPr>
+      </p:pic>
+      <p:cxnSp>
+        <p:nvCxnSpPr>
+          <p:cNvPr id="9" name="Straight Arrow Connector 8"/>
+          <p:cNvCxnSpPr/>
+          <p:nvPr/>
+        </p:nvCxnSpPr>
+        <p:spPr>
+          <a:xfrm>
+            <a:off x="1763688" y="4869160"/>
+            <a:ext cx="144016" cy="432048"/>
+          </a:xfrm>
+          <a:prstGeom prst="straightConnector1">
+            <a:avLst/>
+          </a:prstGeom>
+          <a:ln>
+            <a:tailEnd type="arrow"/>
+          </a:ln>
+        </p:spPr>
+        <p:style>
+          <a:lnRef idx="1">
+            <a:schemeClr val="accent1"/>
+          </a:lnRef>
+          <a:fillRef idx="0">
+            <a:schemeClr val="accent1"/>
+          </a:fillRef>
+          <a:effectRef idx="0">
+            <a:schemeClr val="accent1"/>
+          </a:effectRef>
+          <a:fontRef idx="minor">
+            <a:schemeClr val="tx1"/>
+          </a:fontRef>
+        </p:style>
+      </p:cxnSp>
+      <p:cxnSp>
+        <p:nvCxnSpPr>
+          <p:cNvPr id="10" name="Straight Arrow Connector 9"/>
+          <p:cNvCxnSpPr/>
+          <p:nvPr/>
+        </p:nvCxnSpPr>
+        <p:spPr>
+          <a:xfrm>
+            <a:off x="4067944" y="5085184"/>
+            <a:ext cx="144016" cy="432048"/>
+          </a:xfrm>
+          <a:prstGeom prst="straightConnector1">
+            <a:avLst/>
+          </a:prstGeom>
+          <a:ln>
+            <a:tailEnd type="arrow"/>
+          </a:ln>
+        </p:spPr>
+        <p:style>
+          <a:lnRef idx="1">
+            <a:schemeClr val="accent1"/>
+          </a:lnRef>
+          <a:fillRef idx="0">
+            <a:schemeClr val="accent1"/>
+          </a:fillRef>
+          <a:effectRef idx="0">
+            <a:schemeClr val="accent1"/>
+          </a:effectRef>
+          <a:fontRef idx="minor">
+            <a:schemeClr val="tx1"/>
+          </a:fontRef>
+        </p:style>
+      </p:cxnSp>
+      <p:cxnSp>
+        <p:nvCxnSpPr>
+          <p:cNvPr id="11" name="Straight Arrow Connector 10"/>
+          <p:cNvCxnSpPr/>
+          <p:nvPr/>
+        </p:nvCxnSpPr>
+        <p:spPr>
+          <a:xfrm>
+            <a:off x="5436096" y="4941168"/>
+            <a:ext cx="144016" cy="432048"/>
+          </a:xfrm>
+          <a:prstGeom prst="straightConnector1">
+            <a:avLst/>
+          </a:prstGeom>
+          <a:ln>
+            <a:tailEnd type="arrow"/>
+          </a:ln>
+        </p:spPr>
+        <p:style>
+          <a:lnRef idx="1">
+            <a:schemeClr val="accent1"/>
+          </a:lnRef>
+          <a:fillRef idx="0">
+            <a:schemeClr val="accent1"/>
+          </a:fillRef>
+          <a:effectRef idx="0">
+            <a:schemeClr val="accent1"/>
+          </a:effectRef>
+          <a:fontRef idx="minor">
+            <a:schemeClr val="tx1"/>
+          </a:fontRef>
+        </p:style>
+      </p:cxnSp>
+      <p:cxnSp>
+        <p:nvCxnSpPr>
+          <p:cNvPr id="12" name="Straight Arrow Connector 11"/>
+          <p:cNvCxnSpPr/>
+          <p:nvPr/>
+        </p:nvCxnSpPr>
+        <p:spPr>
+          <a:xfrm>
+            <a:off x="6876256" y="4653136"/>
+            <a:ext cx="144016" cy="432048"/>
+          </a:xfrm>
+          <a:prstGeom prst="straightConnector1">
+            <a:avLst/>
+          </a:prstGeom>
+          <a:ln>
+            <a:tailEnd type="arrow"/>
+          </a:ln>
+        </p:spPr>
+        <p:style>
+          <a:lnRef idx="1">
+            <a:schemeClr val="accent1"/>
+          </a:lnRef>
+          <a:fillRef idx="0">
+            <a:schemeClr val="accent1"/>
+          </a:fillRef>
+          <a:effectRef idx="0">
+            <a:schemeClr val="accent1"/>
+          </a:effectRef>
+          <a:fontRef idx="minor">
+            <a:schemeClr val="tx1"/>
+          </a:fontRef>
+        </p:style>
+      </p:cxnSp>
+      <p:cxnSp>
+        <p:nvCxnSpPr>
+          <p:cNvPr id="14" name="Straight Arrow Connector 13"/>
+          <p:cNvCxnSpPr/>
+          <p:nvPr/>
+        </p:nvCxnSpPr>
+        <p:spPr>
+          <a:xfrm>
+            <a:off x="3923928" y="5661248"/>
+            <a:ext cx="504056" cy="144016"/>
+          </a:xfrm>
+          <a:prstGeom prst="straightConnector1">
+            <a:avLst/>
+          </a:prstGeom>
+          <a:ln>
+            <a:headEnd type="arrow"/>
+            <a:tailEnd type="arrow"/>
+          </a:ln>
+        </p:spPr>
+        <p:style>
+          <a:lnRef idx="1">
+            <a:schemeClr val="accent1"/>
+          </a:lnRef>
+          <a:fillRef idx="0">
+            <a:schemeClr val="accent1"/>
+          </a:fillRef>
+          <a:effectRef idx="0">
+            <a:schemeClr val="accent1"/>
+          </a:effectRef>
+          <a:fontRef idx="minor">
+            <a:schemeClr val="tx1"/>
+          </a:fontRef>
+        </p:style>
+      </p:cxnSp>
+      <p:sp>
+        <p:nvSpPr>
+          <p:cNvPr id="16" name="TextBox 15"/>
+          <p:cNvSpPr txBox="1"/>
+          <p:nvPr/>
+        </p:nvSpPr>
+        <p:spPr>
+          <a:xfrm>
+            <a:off x="827584" y="4509120"/>
+            <a:ext cx="2520280" cy="276999"/>
+          </a:xfrm>
+          <a:prstGeom prst="rect">
+            <a:avLst/>
+          </a:prstGeom>
+          <a:noFill/>
+        </p:spPr>
+        <p:txBody>
+          <a:bodyPr wrap="square" rtlCol="0">
+            <a:spAutoFit/>
+          </a:bodyPr>
+          <a:lstStyle/>
+          <a:p>
+            <a:r>
+              <a:rPr lang="en-GB" sz="1200" dirty="0" smtClean="0"/>
+              <a:t>Different level frictions.</a:t>
+            </a:r>
+            <a:endParaRPr lang="en-GB" sz="1200" dirty="0"/>
+          </a:p>
+        </p:txBody>
+      </p:sp>
+      <p:sp>
+        <p:nvSpPr>
+          <p:cNvPr id="17" name="TextBox 16"/>
+          <p:cNvSpPr txBox="1"/>
+          <p:nvPr/>
+        </p:nvSpPr>
+        <p:spPr>
+          <a:xfrm>
+            <a:off x="2915816" y="4797152"/>
+            <a:ext cx="2520280" cy="276999"/>
+          </a:xfrm>
+          <a:prstGeom prst="rect">
+            <a:avLst/>
+          </a:prstGeom>
+          <a:noFill/>
+        </p:spPr>
+        <p:txBody>
+          <a:bodyPr wrap="square" rtlCol="0">
+            <a:spAutoFit/>
+          </a:bodyPr>
+          <a:lstStyle/>
+          <a:p>
+            <a:r>
+              <a:rPr lang="en-GB" sz="1200" dirty="0" smtClean="0"/>
+              <a:t>Moving end goal.</a:t>
+            </a:r>
+            <a:endParaRPr lang="en-GB" sz="1200" dirty="0"/>
+          </a:p>
+        </p:txBody>
+      </p:sp>
+      <p:sp>
+        <p:nvSpPr>
+          <p:cNvPr id="18" name="TextBox 17"/>
+          <p:cNvSpPr txBox="1"/>
+          <p:nvPr/>
+        </p:nvSpPr>
+        <p:spPr>
+          <a:xfrm>
+            <a:off x="5148064" y="4653136"/>
+            <a:ext cx="648072" cy="276999"/>
+          </a:xfrm>
+          <a:prstGeom prst="rect">
+            <a:avLst/>
+          </a:prstGeom>
+          <a:noFill/>
+        </p:spPr>
+        <p:txBody>
+          <a:bodyPr wrap="square" rtlCol="0">
+            <a:spAutoFit/>
+          </a:bodyPr>
+          <a:lstStyle/>
+          <a:p>
+            <a:r>
+              <a:rPr lang="en-GB" sz="1200" dirty="0" smtClean="0"/>
+              <a:t>Jumps.</a:t>
+            </a:r>
+            <a:endParaRPr lang="en-GB" sz="1200" dirty="0"/>
+          </a:p>
+        </p:txBody>
+      </p:sp>
+      <p:sp>
+        <p:nvSpPr>
+          <p:cNvPr id="19" name="TextBox 18"/>
+          <p:cNvSpPr txBox="1"/>
+          <p:nvPr/>
+        </p:nvSpPr>
+        <p:spPr>
+          <a:xfrm>
+            <a:off x="5724128" y="4365104"/>
+            <a:ext cx="3168352" cy="276999"/>
+          </a:xfrm>
+          <a:prstGeom prst="rect">
+            <a:avLst/>
+          </a:prstGeom>
+          <a:noFill/>
+        </p:spPr>
+        <p:txBody>
+          <a:bodyPr wrap="square" rtlCol="0">
+            <a:spAutoFit/>
+          </a:bodyPr>
+          <a:lstStyle/>
+          <a:p>
+            <a:r>
+              <a:rPr lang="en-GB" sz="1200" dirty="0" smtClean="0"/>
+              <a:t>Large and friction affecting player character.</a:t>
+            </a:r>
+            <a:endParaRPr lang="en-GB" sz="1200" dirty="0"/>
           </a:p>
         </p:txBody>
       </p:sp>
@@ -4568,7 +5674,7 @@
           <a:p>
             <a:r>
               <a:rPr lang="en-GB" dirty="0" smtClean="0"/>
-              <a:t>Intended Player Experience</a:t>
+              <a:t>Research + Demographic</a:t>
             </a:r>
             <a:endParaRPr lang="en-GB" dirty="0"/>
           </a:p>
@@ -4591,12 +5697,129 @@
           <a:p>
             <a:r>
               <a:rPr lang="en-GB" dirty="0" smtClean="0"/>
-              <a:t>(what we want the player to feel)</a:t>
-            </a:r>
-            <a:endParaRPr lang="en-GB" dirty="0"/>
-          </a:p>
-        </p:txBody>
-      </p:sp>
+              <a:t>Established demographic of mostly males aged 12 – 35</a:t>
+            </a:r>
+          </a:p>
+          <a:p>
+            <a:r>
+              <a:rPr lang="en-GB" dirty="0" smtClean="0"/>
+              <a:t>Colourful</a:t>
+            </a:r>
+          </a:p>
+          <a:p>
+            <a:r>
+              <a:rPr lang="en-GB" dirty="0" smtClean="0"/>
+              <a:t>Vibrant</a:t>
+            </a:r>
+          </a:p>
+          <a:p>
+            <a:r>
+              <a:rPr lang="en-GB" dirty="0" smtClean="0"/>
+              <a:t>Minimalist or smooth</a:t>
+            </a:r>
+            <a:endParaRPr lang="en-GB" dirty="0" smtClean="0"/>
+          </a:p>
+        </p:txBody>
+      </p:sp>
+      <p:pic>
+        <p:nvPicPr>
+          <p:cNvPr id="10242" name="Picture 2" descr="http://vignette1.wikia.nocookie.net/nintendo/images/c/cf/Sochi_2014_curling.jpg/revision/latest?cb=20131010221718&amp;path-prefix=en"/>
+          <p:cNvPicPr>
+            <a:picLocks noChangeAspect="1" noChangeArrowheads="1"/>
+          </p:cNvPicPr>
+          <p:nvPr/>
+        </p:nvPicPr>
+        <p:blipFill>
+          <a:blip r:embed="rId2" cstate="print"/>
+          <a:srcRect/>
+          <a:stretch>
+            <a:fillRect/>
+          </a:stretch>
+        </p:blipFill>
+        <p:spPr bwMode="auto">
+          <a:xfrm>
+            <a:off x="683568" y="4509120"/>
+            <a:ext cx="3529531" cy="1985362"/>
+          </a:xfrm>
+          <a:prstGeom prst="rect">
+            <a:avLst/>
+          </a:prstGeom>
+          <a:noFill/>
+          <a:ln>
+            <a:solidFill>
+              <a:schemeClr val="accent1">
+                <a:lumMod val="75000"/>
+              </a:schemeClr>
+            </a:solidFill>
+          </a:ln>
+        </p:spPr>
+      </p:pic>
+      <p:pic>
+        <p:nvPicPr>
+          <p:cNvPr id="10244" name="Picture 4" descr="http://cdn-www.bluestacks.com/AndroidTapp/2010/09/Angry-Birds-in-Game-Play-1.jpg"/>
+          <p:cNvPicPr>
+            <a:picLocks noChangeAspect="1" noChangeArrowheads="1"/>
+          </p:cNvPicPr>
+          <p:nvPr/>
+        </p:nvPicPr>
+        <p:blipFill>
+          <a:blip r:embed="rId3" cstate="print"/>
+          <a:srcRect/>
+          <a:stretch>
+            <a:fillRect/>
+          </a:stretch>
+        </p:blipFill>
+        <p:spPr bwMode="auto">
+          <a:xfrm>
+            <a:off x="5940152" y="4581128"/>
+            <a:ext cx="2916323" cy="1944216"/>
+          </a:xfrm>
+          <a:prstGeom prst="rect">
+            <a:avLst/>
+          </a:prstGeom>
+          <a:noFill/>
+          <a:ln>
+            <a:solidFill>
+              <a:schemeClr val="accent1">
+                <a:lumMod val="75000"/>
+              </a:schemeClr>
+            </a:solidFill>
+          </a:ln>
+        </p:spPr>
+      </p:pic>
+      <p:pic>
+        <p:nvPicPr>
+          <p:cNvPr id="10246" name="Picture 6" descr="https://lh3.ggpht.com/XEFsgp_gloBiSrP1q3RdfsoW3KU6odmXX_FCgDlSJq1Q9W-UuSyZxnGpAQsIfVdvTg=h900"/>
+          <p:cNvPicPr>
+            <a:picLocks noChangeAspect="1" noChangeArrowheads="1"/>
+          </p:cNvPicPr>
+          <p:nvPr/>
+        </p:nvPicPr>
+        <p:blipFill>
+          <a:blip r:embed="rId4" cstate="print"/>
+          <a:srcRect/>
+          <a:stretch>
+            <a:fillRect/>
+          </a:stretch>
+        </p:blipFill>
+        <p:spPr bwMode="auto">
+          <a:xfrm>
+            <a:off x="4860032" y="2852936"/>
+            <a:ext cx="1872208" cy="2496277"/>
+          </a:xfrm>
+          <a:prstGeom prst="rect">
+            <a:avLst/>
+          </a:prstGeom>
+          <a:noFill/>
+          <a:ln>
+            <a:solidFill>
+              <a:schemeClr val="accent1">
+                <a:lumMod val="75000"/>
+              </a:schemeClr>
+            </a:solidFill>
+          </a:ln>
+        </p:spPr>
+      </p:pic>
     </p:spTree>
   </p:cSld>
   <p:clrMapOvr>
@@ -4634,14 +5857,12 @@
         </p:nvSpPr>
         <p:spPr/>
         <p:txBody>
-          <a:bodyPr>
-            <a:normAutofit/>
-          </a:bodyPr>
+          <a:bodyPr/>
           <a:lstStyle/>
           <a:p>
             <a:r>
               <a:rPr lang="en-GB" dirty="0" smtClean="0"/>
-              <a:t>Mood Boards</a:t>
+              <a:t>Intended Player Experience</a:t>
             </a:r>
             <a:endParaRPr lang="en-GB" dirty="0"/>
           </a:p>
@@ -4662,7 +5883,25 @@
           <a:bodyPr/>
           <a:lstStyle/>
           <a:p>
-            <a:endParaRPr lang="en-GB"/>
+            <a:r>
+              <a:rPr lang="en-GB" dirty="0" smtClean="0"/>
+              <a:t>Fiero</a:t>
+            </a:r>
+          </a:p>
+          <a:p>
+            <a:r>
+              <a:rPr lang="en-GB" dirty="0" smtClean="0"/>
+              <a:t>People Fun</a:t>
+            </a:r>
+          </a:p>
+          <a:p>
+            <a:r>
+              <a:rPr lang="en-GB" dirty="0" smtClean="0"/>
+              <a:t>Competitiveness</a:t>
+            </a:r>
+          </a:p>
+          <a:p>
+            <a:endParaRPr lang="en-GB" dirty="0"/>
           </a:p>
         </p:txBody>
       </p:sp>
@@ -4708,7 +5947,15 @@
           <a:p>
             <a:r>
               <a:rPr lang="en-GB" dirty="0" smtClean="0"/>
-              <a:t>Concept Art</a:t>
+              <a:t>Design </a:t>
+            </a:r>
+            <a:r>
+              <a:rPr lang="en-GB" dirty="0" smtClean="0"/>
+              <a:t>I</a:t>
+            </a:r>
+            <a:r>
+              <a:rPr lang="en-GB" dirty="0" smtClean="0"/>
+              <a:t>deas and Themes</a:t>
             </a:r>
             <a:endParaRPr lang="en-GB" dirty="0"/>
           </a:p>
@@ -4729,7 +5976,41 @@
           <a:bodyPr/>
           <a:lstStyle/>
           <a:p>
-            <a:endParaRPr lang="en-GB"/>
+            <a:r>
+              <a:rPr lang="en-GB" b="1" dirty="0" smtClean="0"/>
+              <a:t>Best egg chef</a:t>
+            </a:r>
+          </a:p>
+          <a:p>
+            <a:r>
+              <a:rPr lang="en-GB" b="1" dirty="0" smtClean="0"/>
+              <a:t>Stunt snails</a:t>
+            </a:r>
+          </a:p>
+          <a:p>
+            <a:pPr>
+              <a:buNone/>
+            </a:pPr>
+            <a:endParaRPr lang="en-GB" dirty="0" smtClean="0"/>
+          </a:p>
+          <a:p>
+            <a:r>
+              <a:rPr lang="en-GB" dirty="0" smtClean="0"/>
+              <a:t>Toilet cleaning</a:t>
+            </a:r>
+          </a:p>
+          <a:p>
+            <a:r>
+              <a:rPr lang="en-GB" dirty="0" smtClean="0"/>
+              <a:t>Dolphin oil spill</a:t>
+            </a:r>
+          </a:p>
+          <a:p>
+            <a:r>
+              <a:rPr lang="en-GB" dirty="0" smtClean="0"/>
+              <a:t>Headlice removal</a:t>
+            </a:r>
+            <a:endParaRPr lang="en-GB" dirty="0"/>
           </a:p>
         </p:txBody>
       </p:sp>
@@ -4775,7 +6056,7 @@
           <a:p>
             <a:r>
               <a:rPr lang="en-GB" dirty="0" smtClean="0"/>
-              <a:t>Design Choices</a:t>
+              <a:t>Concept Art</a:t>
             </a:r>
             <a:endParaRPr lang="en-GB" dirty="0"/>
           </a:p>
@@ -4796,11 +6077,7 @@
           <a:bodyPr/>
           <a:lstStyle/>
           <a:p>
-            <a:r>
-              <a:rPr lang="en-GB" dirty="0" smtClean="0"/>
-              <a:t>(typography, colour palettes etc.)</a:t>
-            </a:r>
-            <a:endParaRPr lang="en-GB" dirty="0"/>
+            <a:endParaRPr lang="en-GB"/>
           </a:p>
         </p:txBody>
       </p:sp>
@@ -5105,4 +6382,287 @@
   <a:objectDefaults/>
   <a:extraClrSchemeLst/>
 </a:theme>
+</file>
+
+<file path=ppt/theme/theme2.xml><?xml version="1.0" encoding="utf-8"?>
+<a:theme xmlns:a="http://schemas.openxmlformats.org/drawingml/2006/main" name="Office Theme">
+  <a:themeElements>
+    <a:clrScheme name="Office">
+      <a:dk1>
+        <a:sysClr val="windowText" lastClr="000000"/>
+      </a:dk1>
+      <a:lt1>
+        <a:sysClr val="window" lastClr="FFFFFF"/>
+      </a:lt1>
+      <a:dk2>
+        <a:srgbClr val="1F497D"/>
+      </a:dk2>
+      <a:lt2>
+        <a:srgbClr val="EEECE1"/>
+      </a:lt2>
+      <a:accent1>
+        <a:srgbClr val="4F81BD"/>
+      </a:accent1>
+      <a:accent2>
+        <a:srgbClr val="C0504D"/>
+      </a:accent2>
+      <a:accent3>
+        <a:srgbClr val="9BBB59"/>
+      </a:accent3>
+      <a:accent4>
+        <a:srgbClr val="8064A2"/>
+      </a:accent4>
+      <a:accent5>
+        <a:srgbClr val="4BACC6"/>
+      </a:accent5>
+      <a:accent6>
+        <a:srgbClr val="F79646"/>
+      </a:accent6>
+      <a:hlink>
+        <a:srgbClr val="0000FF"/>
+      </a:hlink>
+      <a:folHlink>
+        <a:srgbClr val="800080"/>
+      </a:folHlink>
+    </a:clrScheme>
+    <a:fontScheme name="Office">
+      <a:majorFont>
+        <a:latin typeface="Calibri"/>
+        <a:ea typeface=""/>
+        <a:cs typeface=""/>
+        <a:font script="Jpan" typeface="ＭＳ Ｐゴシック"/>
+        <a:font script="Hang" typeface="맑은 고딕"/>
+        <a:font script="Hans" typeface="宋体"/>
+        <a:font script="Hant" typeface="新細明體"/>
+        <a:font script="Arab" typeface="Times New Roman"/>
+        <a:font script="Hebr" typeface="Times New Roman"/>
+        <a:font script="Thai" typeface="Angsana New"/>
+        <a:font script="Ethi" typeface="Nyala"/>
+        <a:font script="Beng" typeface="Vrinda"/>
+        <a:font script="Gujr" typeface="Shruti"/>
+        <a:font script="Khmr" typeface="MoolBoran"/>
+        <a:font script="Knda" typeface="Tunga"/>
+        <a:font script="Guru" typeface="Raavi"/>
+        <a:font script="Cans" typeface="Euphemia"/>
+        <a:font script="Cher" typeface="Plantagenet Cherokee"/>
+        <a:font script="Yiii" typeface="Microsoft Yi Baiti"/>
+        <a:font script="Tibt" typeface="Microsoft Himalaya"/>
+        <a:font script="Thaa" typeface="MV Boli"/>
+        <a:font script="Deva" typeface="Mangal"/>
+        <a:font script="Telu" typeface="Gautami"/>
+        <a:font script="Taml" typeface="Latha"/>
+        <a:font script="Syrc" typeface="Estrangelo Edessa"/>
+        <a:font script="Orya" typeface="Kalinga"/>
+        <a:font script="Mlym" typeface="Kartika"/>
+        <a:font script="Laoo" typeface="DokChampa"/>
+        <a:font script="Sinh" typeface="Iskoola Pota"/>
+        <a:font script="Mong" typeface="Mongolian Baiti"/>
+        <a:font script="Viet" typeface="Times New Roman"/>
+        <a:font script="Uigh" typeface="Microsoft Uighur"/>
+      </a:majorFont>
+      <a:minorFont>
+        <a:latin typeface="Calibri"/>
+        <a:ea typeface=""/>
+        <a:cs typeface=""/>
+        <a:font script="Jpan" typeface="ＭＳ Ｐゴシック"/>
+        <a:font script="Hang" typeface="맑은 고딕"/>
+        <a:font script="Hans" typeface="宋体"/>
+        <a:font script="Hant" typeface="新細明體"/>
+        <a:font script="Arab" typeface="Arial"/>
+        <a:font script="Hebr" typeface="Arial"/>
+        <a:font script="Thai" typeface="Cordia New"/>
+        <a:font script="Ethi" typeface="Nyala"/>
+        <a:font script="Beng" typeface="Vrinda"/>
+        <a:font script="Gujr" typeface="Shruti"/>
+        <a:font script="Khmr" typeface="DaunPenh"/>
+        <a:font script="Knda" typeface="Tunga"/>
+        <a:font script="Guru" typeface="Raavi"/>
+        <a:font script="Cans" typeface="Euphemia"/>
+        <a:font script="Cher" typeface="Plantagenet Cherokee"/>
+        <a:font script="Yiii" typeface="Microsoft Yi Baiti"/>
+        <a:font script="Tibt" typeface="Microsoft Himalaya"/>
+        <a:font script="Thaa" typeface="MV Boli"/>
+        <a:font script="Deva" typeface="Mangal"/>
+        <a:font script="Telu" typeface="Gautami"/>
+        <a:font script="Taml" typeface="Latha"/>
+        <a:font script="Syrc" typeface="Estrangelo Edessa"/>
+        <a:font script="Orya" typeface="Kalinga"/>
+        <a:font script="Mlym" typeface="Kartika"/>
+        <a:font script="Laoo" typeface="DokChampa"/>
+        <a:font script="Sinh" typeface="Iskoola Pota"/>
+        <a:font script="Mong" typeface="Mongolian Baiti"/>
+        <a:font script="Viet" typeface="Arial"/>
+        <a:font script="Uigh" typeface="Microsoft Uighur"/>
+      </a:minorFont>
+    </a:fontScheme>
+    <a:fmtScheme name="Office">
+      <a:fillStyleLst>
+        <a:solidFill>
+          <a:schemeClr val="phClr"/>
+        </a:solidFill>
+        <a:gradFill rotWithShape="1">
+          <a:gsLst>
+            <a:gs pos="0">
+              <a:schemeClr val="phClr">
+                <a:tint val="50000"/>
+                <a:satMod val="300000"/>
+              </a:schemeClr>
+            </a:gs>
+            <a:gs pos="35000">
+              <a:schemeClr val="phClr">
+                <a:tint val="37000"/>
+                <a:satMod val="300000"/>
+              </a:schemeClr>
+            </a:gs>
+            <a:gs pos="100000">
+              <a:schemeClr val="phClr">
+                <a:tint val="15000"/>
+                <a:satMod val="350000"/>
+              </a:schemeClr>
+            </a:gs>
+          </a:gsLst>
+          <a:lin ang="16200000" scaled="1"/>
+        </a:gradFill>
+        <a:gradFill rotWithShape="1">
+          <a:gsLst>
+            <a:gs pos="0">
+              <a:schemeClr val="phClr">
+                <a:shade val="51000"/>
+                <a:satMod val="130000"/>
+              </a:schemeClr>
+            </a:gs>
+            <a:gs pos="80000">
+              <a:schemeClr val="phClr">
+                <a:shade val="93000"/>
+                <a:satMod val="130000"/>
+              </a:schemeClr>
+            </a:gs>
+            <a:gs pos="100000">
+              <a:schemeClr val="phClr">
+                <a:shade val="94000"/>
+                <a:satMod val="135000"/>
+              </a:schemeClr>
+            </a:gs>
+          </a:gsLst>
+          <a:lin ang="16200000" scaled="0"/>
+        </a:gradFill>
+      </a:fillStyleLst>
+      <a:lnStyleLst>
+        <a:ln w="9525" cap="flat" cmpd="sng" algn="ctr">
+          <a:solidFill>
+            <a:schemeClr val="phClr">
+              <a:shade val="95000"/>
+              <a:satMod val="105000"/>
+            </a:schemeClr>
+          </a:solidFill>
+          <a:prstDash val="solid"/>
+        </a:ln>
+        <a:ln w="25400" cap="flat" cmpd="sng" algn="ctr">
+          <a:solidFill>
+            <a:schemeClr val="phClr"/>
+          </a:solidFill>
+          <a:prstDash val="solid"/>
+        </a:ln>
+        <a:ln w="38100" cap="flat" cmpd="sng" algn="ctr">
+          <a:solidFill>
+            <a:schemeClr val="phClr"/>
+          </a:solidFill>
+          <a:prstDash val="solid"/>
+        </a:ln>
+      </a:lnStyleLst>
+      <a:effectStyleLst>
+        <a:effectStyle>
+          <a:effectLst>
+            <a:outerShdw blurRad="40000" dist="20000" dir="5400000" rotWithShape="0">
+              <a:srgbClr val="000000">
+                <a:alpha val="38000"/>
+              </a:srgbClr>
+            </a:outerShdw>
+          </a:effectLst>
+        </a:effectStyle>
+        <a:effectStyle>
+          <a:effectLst>
+            <a:outerShdw blurRad="40000" dist="23000" dir="5400000" rotWithShape="0">
+              <a:srgbClr val="000000">
+                <a:alpha val="35000"/>
+              </a:srgbClr>
+            </a:outerShdw>
+          </a:effectLst>
+        </a:effectStyle>
+        <a:effectStyle>
+          <a:effectLst>
+            <a:outerShdw blurRad="40000" dist="23000" dir="5400000" rotWithShape="0">
+              <a:srgbClr val="000000">
+                <a:alpha val="35000"/>
+              </a:srgbClr>
+            </a:outerShdw>
+          </a:effectLst>
+          <a:scene3d>
+            <a:camera prst="orthographicFront">
+              <a:rot lat="0" lon="0" rev="0"/>
+            </a:camera>
+            <a:lightRig rig="threePt" dir="t">
+              <a:rot lat="0" lon="0" rev="1200000"/>
+            </a:lightRig>
+          </a:scene3d>
+          <a:sp3d>
+            <a:bevelT w="63500" h="25400"/>
+          </a:sp3d>
+        </a:effectStyle>
+      </a:effectStyleLst>
+      <a:bgFillStyleLst>
+        <a:solidFill>
+          <a:schemeClr val="phClr"/>
+        </a:solidFill>
+        <a:gradFill rotWithShape="1">
+          <a:gsLst>
+            <a:gs pos="0">
+              <a:schemeClr val="phClr">
+                <a:tint val="40000"/>
+                <a:satMod val="350000"/>
+              </a:schemeClr>
+            </a:gs>
+            <a:gs pos="40000">
+              <a:schemeClr val="phClr">
+                <a:tint val="45000"/>
+                <a:shade val="99000"/>
+                <a:satMod val="350000"/>
+              </a:schemeClr>
+            </a:gs>
+            <a:gs pos="100000">
+              <a:schemeClr val="phClr">
+                <a:shade val="20000"/>
+                <a:satMod val="255000"/>
+              </a:schemeClr>
+            </a:gs>
+          </a:gsLst>
+          <a:path path="circle">
+            <a:fillToRect l="50000" t="-80000" r="50000" b="180000"/>
+          </a:path>
+        </a:gradFill>
+        <a:gradFill rotWithShape="1">
+          <a:gsLst>
+            <a:gs pos="0">
+              <a:schemeClr val="phClr">
+                <a:tint val="80000"/>
+                <a:satMod val="300000"/>
+              </a:schemeClr>
+            </a:gs>
+            <a:gs pos="100000">
+              <a:schemeClr val="phClr">
+                <a:shade val="30000"/>
+                <a:satMod val="200000"/>
+              </a:schemeClr>
+            </a:gs>
+          </a:gsLst>
+          <a:path path="circle">
+            <a:fillToRect l="50000" t="50000" r="50000" b="50000"/>
+          </a:path>
+        </a:gradFill>
+      </a:bgFillStyleLst>
+    </a:fmtScheme>
+  </a:themeElements>
+  <a:objectDefaults/>
+  <a:extraClrSchemeLst/>
+</a:theme>
 </file>
</xml_diff>